<commit_message>
Added some create content slides that I don't like.
</commit_message>
<xml_diff>
--- a/src/introToContentTypes.pptx
+++ b/src/introToContentTypes.pptx
@@ -32,9 +32,10 @@
     <p:sldId id="289" r:id="rId26"/>
     <p:sldId id="290" r:id="rId27"/>
     <p:sldId id="291" r:id="rId28"/>
-    <p:sldId id="283" r:id="rId29"/>
-    <p:sldId id="274" r:id="rId30"/>
-    <p:sldId id="273" r:id="rId31"/>
+    <p:sldId id="297" r:id="rId29"/>
+    <p:sldId id="283" r:id="rId30"/>
+    <p:sldId id="274" r:id="rId31"/>
+    <p:sldId id="273" r:id="rId32"/>
   </p:sldIdLst>
   <p:sldSz cx="9144000" cy="6858000" type="screen4x3"/>
   <p:notesSz cx="6858000" cy="9144000"/>
@@ -317,7 +318,7 @@
           <a:p>
             <a:fld id="{F7C18A40-5E76-DB4D-B5BF-1B27BC724626}" type="datetimeFigureOut">
               <a:rPr lang="en-US" smtClean="0"/>
-              <a:t>6/17/15</a:t>
+              <a:t>6/18/15</a:t>
             </a:fld>
             <a:endParaRPr lang="en-US"/>
           </a:p>
@@ -487,7 +488,7 @@
           <a:p>
             <a:fld id="{F7C18A40-5E76-DB4D-B5BF-1B27BC724626}" type="datetimeFigureOut">
               <a:rPr lang="en-US" smtClean="0"/>
-              <a:t>6/17/15</a:t>
+              <a:t>6/18/15</a:t>
             </a:fld>
             <a:endParaRPr lang="en-US"/>
           </a:p>
@@ -667,7 +668,7 @@
           <a:p>
             <a:fld id="{F7C18A40-5E76-DB4D-B5BF-1B27BC724626}" type="datetimeFigureOut">
               <a:rPr lang="en-US" smtClean="0"/>
-              <a:t>6/17/15</a:t>
+              <a:t>6/18/15</a:t>
             </a:fld>
             <a:endParaRPr lang="en-US"/>
           </a:p>
@@ -837,7 +838,7 @@
           <a:p>
             <a:fld id="{F7C18A40-5E76-DB4D-B5BF-1B27BC724626}" type="datetimeFigureOut">
               <a:rPr lang="en-US" smtClean="0"/>
-              <a:t>6/17/15</a:t>
+              <a:t>6/18/15</a:t>
             </a:fld>
             <a:endParaRPr lang="en-US"/>
           </a:p>
@@ -1083,7 +1084,7 @@
           <a:p>
             <a:fld id="{F7C18A40-5E76-DB4D-B5BF-1B27BC724626}" type="datetimeFigureOut">
               <a:rPr lang="en-US" smtClean="0"/>
-              <a:t>6/17/15</a:t>
+              <a:t>6/18/15</a:t>
             </a:fld>
             <a:endParaRPr lang="en-US"/>
           </a:p>
@@ -1371,7 +1372,7 @@
           <a:p>
             <a:fld id="{F7C18A40-5E76-DB4D-B5BF-1B27BC724626}" type="datetimeFigureOut">
               <a:rPr lang="en-US" smtClean="0"/>
-              <a:t>6/17/15</a:t>
+              <a:t>6/18/15</a:t>
             </a:fld>
             <a:endParaRPr lang="en-US"/>
           </a:p>
@@ -1793,7 +1794,7 @@
           <a:p>
             <a:fld id="{F7C18A40-5E76-DB4D-B5BF-1B27BC724626}" type="datetimeFigureOut">
               <a:rPr lang="en-US" smtClean="0"/>
-              <a:t>6/17/15</a:t>
+              <a:t>6/18/15</a:t>
             </a:fld>
             <a:endParaRPr lang="en-US"/>
           </a:p>
@@ -1911,7 +1912,7 @@
           <a:p>
             <a:fld id="{F7C18A40-5E76-DB4D-B5BF-1B27BC724626}" type="datetimeFigureOut">
               <a:rPr lang="en-US" smtClean="0"/>
-              <a:t>6/17/15</a:t>
+              <a:t>6/18/15</a:t>
             </a:fld>
             <a:endParaRPr lang="en-US"/>
           </a:p>
@@ -2006,7 +2007,7 @@
           <a:p>
             <a:fld id="{F7C18A40-5E76-DB4D-B5BF-1B27BC724626}" type="datetimeFigureOut">
               <a:rPr lang="en-US" smtClean="0"/>
-              <a:t>6/17/15</a:t>
+              <a:t>6/18/15</a:t>
             </a:fld>
             <a:endParaRPr lang="en-US"/>
           </a:p>
@@ -2283,7 +2284,7 @@
           <a:p>
             <a:fld id="{F7C18A40-5E76-DB4D-B5BF-1B27BC724626}" type="datetimeFigureOut">
               <a:rPr lang="en-US" smtClean="0"/>
-              <a:t>6/17/15</a:t>
+              <a:t>6/18/15</a:t>
             </a:fld>
             <a:endParaRPr lang="en-US"/>
           </a:p>
@@ -2536,7 +2537,7 @@
           <a:p>
             <a:fld id="{F7C18A40-5E76-DB4D-B5BF-1B27BC724626}" type="datetimeFigureOut">
               <a:rPr lang="en-US" smtClean="0"/>
-              <a:t>6/17/15</a:t>
+              <a:t>6/18/15</a:t>
             </a:fld>
             <a:endParaRPr lang="en-US"/>
           </a:p>
@@ -2753,7 +2754,7 @@
             <a:fld id="{F7C18A40-5E76-DB4D-B5BF-1B27BC724626}" type="datetimeFigureOut">
               <a:rPr lang="en-US" smtClean="0"/>
               <a:pPr/>
-              <a:t>6/17/15</a:t>
+              <a:t>6/18/15</a:t>
             </a:fld>
             <a:endParaRPr lang="en-US"/>
           </a:p>
@@ -10108,27 +10109,7 @@
                 <a:latin typeface="Anime Ace 2.0 BB"/>
                 <a:cs typeface="Anime Ace 2.0 BB"/>
               </a:rPr>
-              <a:t>Answer the </a:t>
-            </a:r>
-            <a:r>
-              <a:rPr lang="en-US" dirty="0" smtClean="0">
-                <a:solidFill>
-                  <a:srgbClr val="FFFFFF"/>
-                </a:solidFill>
-                <a:latin typeface="Anime Ace 2.0 BB"/>
-                <a:cs typeface="Anime Ace 2.0 BB"/>
-              </a:rPr>
-              <a:t>question </a:t>
-            </a:r>
-            <a:r>
-              <a:rPr lang="en-US" dirty="0" smtClean="0">
-                <a:solidFill>
-                  <a:srgbClr val="FFFFFF"/>
-                </a:solidFill>
-                <a:latin typeface="Anime Ace 2.0 BB"/>
-                <a:cs typeface="Anime Ace 2.0 BB"/>
-              </a:rPr>
-              <a:t>already!</a:t>
+              <a:t>Answer the question already!</a:t>
             </a:r>
             <a:endParaRPr lang="en-US" dirty="0">
               <a:solidFill>
@@ -17866,6 +17847,773 @@
 </file>
 
 <file path=ppt/slides/slide28.xml><?xml version="1.0" encoding="utf-8"?>
+<p:sld xmlns:a="http://schemas.openxmlformats.org/drawingml/2006/main" xmlns:r="http://schemas.openxmlformats.org/officeDocument/2006/relationships" xmlns:p="http://schemas.openxmlformats.org/presentationml/2006/main">
+  <p:cSld>
+    <p:spTree>
+      <p:nvGrpSpPr>
+        <p:cNvPr id="1" name=""/>
+        <p:cNvGrpSpPr/>
+        <p:nvPr/>
+      </p:nvGrpSpPr>
+      <p:grpSpPr>
+        <a:xfrm>
+          <a:off x="0" y="0"/>
+          <a:ext cx="0" cy="0"/>
+          <a:chOff x="0" y="0"/>
+          <a:chExt cx="0" cy="0"/>
+        </a:xfrm>
+      </p:grpSpPr>
+      <p:sp>
+        <p:nvSpPr>
+          <p:cNvPr id="2" name="Rectangle 1"/>
+          <p:cNvSpPr/>
+          <p:nvPr/>
+        </p:nvSpPr>
+        <p:spPr>
+          <a:xfrm>
+            <a:off x="4954549" y="1520807"/>
+            <a:ext cx="4189451" cy="5078314"/>
+          </a:xfrm>
+          <a:prstGeom prst="rect">
+            <a:avLst/>
+          </a:prstGeom>
+        </p:spPr>
+        <p:txBody>
+          <a:bodyPr wrap="square">
+            <a:spAutoFit/>
+          </a:bodyPr>
+          <a:lstStyle/>
+          <a:p>
+            <a:pPr algn="ctr"/>
+            <a:r>
+              <a:rPr lang="en-US" dirty="0" smtClean="0">
+                <a:solidFill>
+                  <a:schemeClr val="bg1"/>
+                </a:solidFill>
+                <a:latin typeface="Anime Ace 2.0 BB"/>
+                <a:cs typeface="Anime Ace 2.0 BB"/>
+              </a:rPr>
+              <a:t>Boolean</a:t>
+            </a:r>
+          </a:p>
+          <a:p>
+            <a:pPr algn="ctr"/>
+            <a:endParaRPr lang="en-US" dirty="0">
+              <a:solidFill>
+                <a:schemeClr val="bg1"/>
+              </a:solidFill>
+              <a:latin typeface="Anime Ace 2.0 BB"/>
+              <a:cs typeface="Anime Ace 2.0 BB"/>
+            </a:endParaRPr>
+          </a:p>
+          <a:p>
+            <a:pPr algn="ctr"/>
+            <a:endParaRPr lang="en-US" dirty="0" smtClean="0">
+              <a:solidFill>
+                <a:schemeClr val="bg1"/>
+              </a:solidFill>
+              <a:latin typeface="Anime Ace 2.0 BB"/>
+              <a:cs typeface="Anime Ace 2.0 BB"/>
+            </a:endParaRPr>
+          </a:p>
+          <a:p>
+            <a:pPr algn="ctr"/>
+            <a:endParaRPr lang="en-US" dirty="0" smtClean="0">
+              <a:solidFill>
+                <a:schemeClr val="bg1"/>
+              </a:solidFill>
+              <a:latin typeface="Anime Ace 2.0 BB"/>
+              <a:cs typeface="Anime Ace 2.0 BB"/>
+            </a:endParaRPr>
+          </a:p>
+          <a:p>
+            <a:pPr algn="ctr"/>
+            <a:r>
+              <a:rPr lang="en-US" dirty="0">
+                <a:solidFill>
+                  <a:schemeClr val="bg1"/>
+                </a:solidFill>
+                <a:latin typeface="Anime Ace 2.0 BB"/>
+                <a:cs typeface="Anime Ace 2.0 BB"/>
+              </a:rPr>
+              <a:t>List (float)</a:t>
+            </a:r>
+          </a:p>
+          <a:p>
+            <a:pPr algn="ctr"/>
+            <a:r>
+              <a:rPr lang="en-US" dirty="0">
+                <a:solidFill>
+                  <a:schemeClr val="bg1"/>
+                </a:solidFill>
+                <a:latin typeface="Anime Ace 2.0 BB"/>
+                <a:cs typeface="Anime Ace 2.0 BB"/>
+              </a:rPr>
+              <a:t>List (integer</a:t>
+            </a:r>
+            <a:r>
+              <a:rPr lang="en-US" dirty="0" smtClean="0">
+                <a:solidFill>
+                  <a:schemeClr val="bg1"/>
+                </a:solidFill>
+                <a:latin typeface="Anime Ace 2.0 BB"/>
+                <a:cs typeface="Anime Ace 2.0 BB"/>
+              </a:rPr>
+              <a:t>)</a:t>
+            </a:r>
+          </a:p>
+          <a:p>
+            <a:pPr algn="ctr"/>
+            <a:r>
+              <a:rPr lang="en-US" dirty="0">
+                <a:solidFill>
+                  <a:schemeClr val="bg1"/>
+                </a:solidFill>
+                <a:latin typeface="Anime Ace 2.0 BB"/>
+                <a:cs typeface="Anime Ace 2.0 BB"/>
+              </a:rPr>
+              <a:t>List (text</a:t>
+            </a:r>
+            <a:r>
+              <a:rPr lang="en-US" dirty="0" smtClean="0">
+                <a:solidFill>
+                  <a:schemeClr val="bg1"/>
+                </a:solidFill>
+                <a:latin typeface="Anime Ace 2.0 BB"/>
+                <a:cs typeface="Anime Ace 2.0 BB"/>
+              </a:rPr>
+              <a:t>)</a:t>
+            </a:r>
+            <a:endParaRPr lang="en-US" dirty="0">
+              <a:solidFill>
+                <a:schemeClr val="bg1"/>
+              </a:solidFill>
+              <a:latin typeface="Anime Ace 2.0 BB"/>
+              <a:cs typeface="Anime Ace 2.0 BB"/>
+            </a:endParaRPr>
+          </a:p>
+          <a:p>
+            <a:pPr algn="ctr"/>
+            <a:r>
+              <a:rPr lang="en-US" dirty="0" smtClean="0">
+                <a:solidFill>
+                  <a:schemeClr val="bg1"/>
+                </a:solidFill>
+                <a:latin typeface="Anime Ace 2.0 BB"/>
+                <a:cs typeface="Anime Ace 2.0 BB"/>
+              </a:rPr>
+              <a:t>Decimal</a:t>
+            </a:r>
+          </a:p>
+          <a:p>
+            <a:pPr algn="ctr"/>
+            <a:r>
+              <a:rPr lang="en-US" dirty="0" smtClean="0">
+                <a:solidFill>
+                  <a:schemeClr val="bg1"/>
+                </a:solidFill>
+                <a:latin typeface="Anime Ace 2.0 BB"/>
+                <a:cs typeface="Anime Ace 2.0 BB"/>
+              </a:rPr>
+              <a:t>FLOAT</a:t>
+            </a:r>
+          </a:p>
+          <a:p>
+            <a:pPr algn="ctr"/>
+            <a:r>
+              <a:rPr lang="en-US" dirty="0" smtClean="0">
+                <a:solidFill>
+                  <a:schemeClr val="bg1"/>
+                </a:solidFill>
+                <a:latin typeface="Anime Ace 2.0 BB"/>
+                <a:cs typeface="Anime Ace 2.0 BB"/>
+              </a:rPr>
+              <a:t>Integer</a:t>
+            </a:r>
+          </a:p>
+          <a:p>
+            <a:pPr algn="ctr"/>
+            <a:endParaRPr lang="en-US" dirty="0">
+              <a:solidFill>
+                <a:schemeClr val="bg1"/>
+              </a:solidFill>
+              <a:latin typeface="Anime Ace 2.0 BB"/>
+              <a:cs typeface="Anime Ace 2.0 BB"/>
+            </a:endParaRPr>
+          </a:p>
+          <a:p>
+            <a:pPr algn="ctr"/>
+            <a:r>
+              <a:rPr lang="en-US" dirty="0">
+                <a:solidFill>
+                  <a:schemeClr val="bg1"/>
+                </a:solidFill>
+                <a:latin typeface="Anime Ace 2.0 BB"/>
+                <a:cs typeface="Anime Ace 2.0 BB"/>
+              </a:rPr>
+              <a:t>File</a:t>
+            </a:r>
+          </a:p>
+          <a:p>
+            <a:pPr algn="ctr"/>
+            <a:r>
+              <a:rPr lang="en-US" dirty="0" smtClean="0">
+                <a:solidFill>
+                  <a:schemeClr val="bg1"/>
+                </a:solidFill>
+                <a:latin typeface="Anime Ace 2.0 BB"/>
+                <a:cs typeface="Anime Ace 2.0 BB"/>
+              </a:rPr>
+              <a:t>Image</a:t>
+            </a:r>
+          </a:p>
+          <a:p>
+            <a:pPr algn="ctr"/>
+            <a:r>
+              <a:rPr lang="en-US" dirty="0">
+                <a:solidFill>
+                  <a:srgbClr val="FFFFFF"/>
+                </a:solidFill>
+                <a:latin typeface="Anime Ace 2.0 BB"/>
+                <a:cs typeface="Anime Ace 2.0 BB"/>
+              </a:rPr>
+              <a:t>Taxonomy </a:t>
+            </a:r>
+            <a:r>
+              <a:rPr lang="en-US" dirty="0" smtClean="0">
+                <a:solidFill>
+                  <a:srgbClr val="FFFFFF"/>
+                </a:solidFill>
+                <a:latin typeface="Anime Ace 2.0 BB"/>
+                <a:cs typeface="Anime Ace 2.0 BB"/>
+              </a:rPr>
+              <a:t>term</a:t>
+            </a:r>
+          </a:p>
+          <a:p>
+            <a:pPr algn="ctr"/>
+            <a:endParaRPr lang="en-US" dirty="0">
+              <a:solidFill>
+                <a:srgbClr val="FFFFFF"/>
+              </a:solidFill>
+              <a:latin typeface="Anime Ace 2.0 BB"/>
+              <a:cs typeface="Anime Ace 2.0 BB"/>
+            </a:endParaRPr>
+          </a:p>
+          <a:p>
+            <a:pPr algn="ctr"/>
+            <a:r>
+              <a:rPr lang="en-US" dirty="0" smtClean="0">
+                <a:solidFill>
+                  <a:schemeClr val="bg1"/>
+                </a:solidFill>
+                <a:latin typeface="Anime Ace 2.0 BB"/>
+                <a:cs typeface="Anime Ace 2.0 BB"/>
+              </a:rPr>
+              <a:t>Long </a:t>
+            </a:r>
+            <a:r>
+              <a:rPr lang="en-US" dirty="0">
+                <a:solidFill>
+                  <a:schemeClr val="bg1"/>
+                </a:solidFill>
+                <a:latin typeface="Anime Ace 2.0 BB"/>
+                <a:cs typeface="Anime Ace 2.0 BB"/>
+              </a:rPr>
+              <a:t>text</a:t>
+            </a:r>
+          </a:p>
+          <a:p>
+            <a:pPr algn="ctr"/>
+            <a:r>
+              <a:rPr lang="en-US" dirty="0">
+                <a:solidFill>
+                  <a:schemeClr val="bg1"/>
+                </a:solidFill>
+                <a:latin typeface="Anime Ace 2.0 BB"/>
+                <a:cs typeface="Anime Ace 2.0 BB"/>
+              </a:rPr>
+              <a:t>Long text </a:t>
+            </a:r>
+            <a:r>
+              <a:rPr lang="en-US" dirty="0" smtClean="0">
+                <a:solidFill>
+                  <a:schemeClr val="bg1"/>
+                </a:solidFill>
+                <a:latin typeface="Anime Ace 2.0 BB"/>
+                <a:cs typeface="Anime Ace 2.0 BB"/>
+              </a:rPr>
+              <a:t>w/ summary</a:t>
+            </a:r>
+          </a:p>
+          <a:p>
+            <a:pPr algn="ctr"/>
+            <a:r>
+              <a:rPr lang="en-US" dirty="0" smtClean="0">
+                <a:solidFill>
+                  <a:schemeClr val="bg1"/>
+                </a:solidFill>
+                <a:latin typeface="Anime Ace 2.0 BB"/>
+                <a:cs typeface="Anime Ace 2.0 BB"/>
+              </a:rPr>
+              <a:t>Text</a:t>
+            </a:r>
+            <a:endParaRPr lang="en-US" dirty="0">
+              <a:solidFill>
+                <a:schemeClr val="bg1"/>
+              </a:solidFill>
+              <a:latin typeface="Anime Ace 2.0 BB"/>
+              <a:cs typeface="Anime Ace 2.0 BB"/>
+            </a:endParaRPr>
+          </a:p>
+        </p:txBody>
+      </p:sp>
+      <p:sp>
+        <p:nvSpPr>
+          <p:cNvPr id="3" name="Rectangle 2"/>
+          <p:cNvSpPr/>
+          <p:nvPr/>
+        </p:nvSpPr>
+        <p:spPr>
+          <a:xfrm>
+            <a:off x="0" y="1520807"/>
+            <a:ext cx="4572000" cy="5078314"/>
+          </a:xfrm>
+          <a:prstGeom prst="rect">
+            <a:avLst/>
+          </a:prstGeom>
+        </p:spPr>
+        <p:txBody>
+          <a:bodyPr>
+            <a:spAutoFit/>
+          </a:bodyPr>
+          <a:lstStyle/>
+          <a:p>
+            <a:pPr algn="ctr"/>
+            <a:r>
+              <a:rPr lang="en-US" dirty="0" smtClean="0">
+                <a:solidFill>
+                  <a:srgbClr val="FFFFFF"/>
+                </a:solidFill>
+                <a:latin typeface="Anime Ace 2.0 BB"/>
+                <a:cs typeface="Anime Ace 2.0 BB"/>
+              </a:rPr>
+              <a:t>Boolean</a:t>
+            </a:r>
+            <a:endParaRPr lang="en-US" dirty="0">
+              <a:solidFill>
+                <a:srgbClr val="FFFFFF"/>
+              </a:solidFill>
+              <a:latin typeface="Anime Ace 2.0 BB"/>
+              <a:cs typeface="Anime Ace 2.0 BB"/>
+            </a:endParaRPr>
+          </a:p>
+          <a:p>
+            <a:pPr algn="ctr"/>
+            <a:r>
+              <a:rPr lang="en-US" dirty="0">
+                <a:solidFill>
+                  <a:srgbClr val="FFFFFF"/>
+                </a:solidFill>
+                <a:latin typeface="Anime Ace 2.0 BB"/>
+                <a:cs typeface="Anime Ace 2.0 BB"/>
+              </a:rPr>
+              <a:t>Comments</a:t>
+            </a:r>
+          </a:p>
+          <a:p>
+            <a:pPr algn="ctr"/>
+            <a:r>
+              <a:rPr lang="en-US" dirty="0">
+                <a:solidFill>
+                  <a:srgbClr val="FFFFFF"/>
+                </a:solidFill>
+                <a:latin typeface="Anime Ace 2.0 BB"/>
+                <a:cs typeface="Anime Ace 2.0 BB"/>
+              </a:rPr>
+              <a:t>Date</a:t>
+            </a:r>
+          </a:p>
+          <a:p>
+            <a:pPr algn="ctr"/>
+            <a:r>
+              <a:rPr lang="en-US" dirty="0">
+                <a:solidFill>
+                  <a:srgbClr val="FFFFFF"/>
+                </a:solidFill>
+                <a:latin typeface="Anime Ace 2.0 BB"/>
+                <a:cs typeface="Anime Ace 2.0 BB"/>
+              </a:rPr>
+              <a:t>Email</a:t>
+            </a:r>
+          </a:p>
+          <a:p>
+            <a:pPr algn="ctr"/>
+            <a:r>
+              <a:rPr lang="en-US" dirty="0">
+                <a:solidFill>
+                  <a:srgbClr val="FFFFFF"/>
+                </a:solidFill>
+                <a:latin typeface="Anime Ace 2.0 BB"/>
+                <a:cs typeface="Anime Ace 2.0 BB"/>
+              </a:rPr>
+              <a:t>List (float)</a:t>
+            </a:r>
+          </a:p>
+          <a:p>
+            <a:pPr algn="ctr"/>
+            <a:r>
+              <a:rPr lang="en-US" dirty="0">
+                <a:solidFill>
+                  <a:srgbClr val="FFFFFF"/>
+                </a:solidFill>
+                <a:latin typeface="Anime Ace 2.0 BB"/>
+                <a:cs typeface="Anime Ace 2.0 BB"/>
+              </a:rPr>
+              <a:t>List (integer</a:t>
+            </a:r>
+            <a:r>
+              <a:rPr lang="en-US" dirty="0" smtClean="0">
+                <a:solidFill>
+                  <a:srgbClr val="FFFFFF"/>
+                </a:solidFill>
+                <a:latin typeface="Anime Ace 2.0 BB"/>
+                <a:cs typeface="Anime Ace 2.0 BB"/>
+              </a:rPr>
+              <a:t>)</a:t>
+            </a:r>
+          </a:p>
+          <a:p>
+            <a:pPr algn="ctr"/>
+            <a:r>
+              <a:rPr lang="en-US" dirty="0">
+                <a:solidFill>
+                  <a:srgbClr val="FFFFFF"/>
+                </a:solidFill>
+                <a:latin typeface="Anime Ace 2.0 BB"/>
+                <a:cs typeface="Anime Ace 2.0 BB"/>
+              </a:rPr>
+              <a:t>List (text</a:t>
+            </a:r>
+            <a:r>
+              <a:rPr lang="en-US" dirty="0" smtClean="0">
+                <a:solidFill>
+                  <a:srgbClr val="FFFFFF"/>
+                </a:solidFill>
+                <a:latin typeface="Anime Ace 2.0 BB"/>
+                <a:cs typeface="Anime Ace 2.0 BB"/>
+              </a:rPr>
+              <a:t>)</a:t>
+            </a:r>
+            <a:endParaRPr lang="en-US" dirty="0">
+              <a:solidFill>
+                <a:srgbClr val="FFFFFF"/>
+              </a:solidFill>
+              <a:latin typeface="Anime Ace 2.0 BB"/>
+              <a:cs typeface="Anime Ace 2.0 BB"/>
+            </a:endParaRPr>
+          </a:p>
+          <a:p>
+            <a:pPr algn="ctr"/>
+            <a:r>
+              <a:rPr lang="en-US" dirty="0" smtClean="0">
+                <a:solidFill>
+                  <a:srgbClr val="FFFFFF"/>
+                </a:solidFill>
+                <a:latin typeface="Anime Ace 2.0 BB"/>
+                <a:cs typeface="Anime Ace 2.0 BB"/>
+              </a:rPr>
+              <a:t>Decimal</a:t>
+            </a:r>
+            <a:endParaRPr lang="en-US" dirty="0">
+              <a:solidFill>
+                <a:srgbClr val="FFFFFF"/>
+              </a:solidFill>
+              <a:latin typeface="Anime Ace 2.0 BB"/>
+              <a:cs typeface="Anime Ace 2.0 BB"/>
+            </a:endParaRPr>
+          </a:p>
+          <a:p>
+            <a:pPr algn="ctr"/>
+            <a:r>
+              <a:rPr lang="en-US" dirty="0" smtClean="0">
+                <a:solidFill>
+                  <a:srgbClr val="FFFFFF"/>
+                </a:solidFill>
+                <a:latin typeface="Anime Ace 2.0 BB"/>
+                <a:cs typeface="Anime Ace 2.0 BB"/>
+              </a:rPr>
+              <a:t>Float</a:t>
+            </a:r>
+            <a:endParaRPr lang="en-US" dirty="0">
+              <a:solidFill>
+                <a:srgbClr val="FFFFFF"/>
+              </a:solidFill>
+              <a:latin typeface="Anime Ace 2.0 BB"/>
+              <a:cs typeface="Anime Ace 2.0 BB"/>
+            </a:endParaRPr>
+          </a:p>
+          <a:p>
+            <a:pPr algn="ctr"/>
+            <a:r>
+              <a:rPr lang="en-US" dirty="0" smtClean="0">
+                <a:solidFill>
+                  <a:srgbClr val="FFFFFF"/>
+                </a:solidFill>
+                <a:latin typeface="Anime Ace 2.0 BB"/>
+                <a:cs typeface="Anime Ace 2.0 BB"/>
+              </a:rPr>
+              <a:t>integer</a:t>
+            </a:r>
+            <a:endParaRPr lang="en-US" dirty="0">
+              <a:solidFill>
+                <a:srgbClr val="FFFFFF"/>
+              </a:solidFill>
+              <a:latin typeface="Anime Ace 2.0 BB"/>
+              <a:cs typeface="Anime Ace 2.0 BB"/>
+            </a:endParaRPr>
+          </a:p>
+          <a:p>
+            <a:pPr algn="ctr"/>
+            <a:r>
+              <a:rPr lang="en-US" dirty="0" smtClean="0">
+                <a:solidFill>
+                  <a:srgbClr val="FFFFFF"/>
+                </a:solidFill>
+                <a:latin typeface="Anime Ace 2.0 BB"/>
+                <a:cs typeface="Anime Ace 2.0 BB"/>
+              </a:rPr>
+              <a:t>Content Reference</a:t>
+            </a:r>
+            <a:endParaRPr lang="en-US" dirty="0">
+              <a:solidFill>
+                <a:srgbClr val="FFFFFF"/>
+              </a:solidFill>
+              <a:latin typeface="Anime Ace 2.0 BB"/>
+              <a:cs typeface="Anime Ace 2.0 BB"/>
+            </a:endParaRPr>
+          </a:p>
+          <a:p>
+            <a:pPr algn="ctr"/>
+            <a:r>
+              <a:rPr lang="en-US" dirty="0" smtClean="0">
+                <a:solidFill>
+                  <a:srgbClr val="FFFFFF"/>
+                </a:solidFill>
+                <a:latin typeface="Anime Ace 2.0 BB"/>
+                <a:cs typeface="Anime Ace 2.0 BB"/>
+              </a:rPr>
+              <a:t>File</a:t>
+            </a:r>
+            <a:endParaRPr lang="en-US" dirty="0">
+              <a:solidFill>
+                <a:srgbClr val="FFFFFF"/>
+              </a:solidFill>
+              <a:latin typeface="Anime Ace 2.0 BB"/>
+              <a:cs typeface="Anime Ace 2.0 BB"/>
+            </a:endParaRPr>
+          </a:p>
+          <a:p>
+            <a:pPr algn="ctr"/>
+            <a:r>
+              <a:rPr lang="en-US" dirty="0">
+                <a:solidFill>
+                  <a:srgbClr val="FFFFFF"/>
+                </a:solidFill>
+                <a:latin typeface="Anime Ace 2.0 BB"/>
+                <a:cs typeface="Anime Ace 2.0 BB"/>
+              </a:rPr>
+              <a:t>Image</a:t>
+            </a:r>
+          </a:p>
+          <a:p>
+            <a:pPr algn="ctr"/>
+            <a:r>
+              <a:rPr lang="en-US" dirty="0">
+                <a:solidFill>
+                  <a:srgbClr val="FFFFFF"/>
+                </a:solidFill>
+                <a:latin typeface="Anime Ace 2.0 BB"/>
+                <a:cs typeface="Anime Ace 2.0 BB"/>
+              </a:rPr>
+              <a:t>Taxonomy term</a:t>
+            </a:r>
+          </a:p>
+          <a:p>
+            <a:pPr algn="ctr"/>
+            <a:r>
+              <a:rPr lang="en-US" dirty="0">
+                <a:solidFill>
+                  <a:srgbClr val="FFFFFF"/>
+                </a:solidFill>
+                <a:latin typeface="Anime Ace 2.0 BB"/>
+                <a:cs typeface="Anime Ace 2.0 BB"/>
+              </a:rPr>
+              <a:t>User</a:t>
+            </a:r>
+          </a:p>
+          <a:p>
+            <a:pPr algn="ctr"/>
+            <a:r>
+              <a:rPr lang="en-US" dirty="0" smtClean="0">
+                <a:solidFill>
+                  <a:srgbClr val="FFFFFF"/>
+                </a:solidFill>
+                <a:latin typeface="Anime Ace 2.0 BB"/>
+                <a:cs typeface="Anime Ace 2.0 BB"/>
+              </a:rPr>
+              <a:t>Long Text </a:t>
+            </a:r>
+            <a:endParaRPr lang="en-US" dirty="0">
+              <a:solidFill>
+                <a:srgbClr val="FFFFFF"/>
+              </a:solidFill>
+              <a:latin typeface="Anime Ace 2.0 BB"/>
+              <a:cs typeface="Anime Ace 2.0 BB"/>
+            </a:endParaRPr>
+          </a:p>
+          <a:p>
+            <a:pPr algn="ctr"/>
+            <a:r>
+              <a:rPr lang="en-US" dirty="0" smtClean="0">
+                <a:solidFill>
+                  <a:srgbClr val="FFFFFF"/>
+                </a:solidFill>
+                <a:latin typeface="Anime Ace 2.0 BB"/>
+                <a:cs typeface="Anime Ace 2.0 BB"/>
+              </a:rPr>
+              <a:t>Long Text w/ summary</a:t>
+            </a:r>
+            <a:endParaRPr lang="en-US" dirty="0">
+              <a:solidFill>
+                <a:srgbClr val="FFFFFF"/>
+              </a:solidFill>
+              <a:latin typeface="Anime Ace 2.0 BB"/>
+              <a:cs typeface="Anime Ace 2.0 BB"/>
+            </a:endParaRPr>
+          </a:p>
+          <a:p>
+            <a:pPr algn="ctr"/>
+            <a:r>
+              <a:rPr lang="en-US" dirty="0" smtClean="0">
+                <a:solidFill>
+                  <a:srgbClr val="FFFFFF"/>
+                </a:solidFill>
+                <a:latin typeface="Anime Ace 2.0 BB"/>
+                <a:cs typeface="Anime Ace 2.0 BB"/>
+              </a:rPr>
+              <a:t>Text </a:t>
+            </a:r>
+            <a:endParaRPr lang="en-US" dirty="0">
+              <a:solidFill>
+                <a:srgbClr val="FFFFFF"/>
+              </a:solidFill>
+              <a:latin typeface="Anime Ace 2.0 BB"/>
+              <a:cs typeface="Anime Ace 2.0 BB"/>
+            </a:endParaRPr>
+          </a:p>
+        </p:txBody>
+      </p:sp>
+      <p:sp>
+        <p:nvSpPr>
+          <p:cNvPr id="4" name="TextBox 3"/>
+          <p:cNvSpPr txBox="1"/>
+          <p:nvPr/>
+        </p:nvSpPr>
+        <p:spPr>
+          <a:xfrm>
+            <a:off x="599703" y="623187"/>
+            <a:ext cx="3367100" cy="707886"/>
+          </a:xfrm>
+          <a:prstGeom prst="rect">
+            <a:avLst/>
+          </a:prstGeom>
+          <a:noFill/>
+        </p:spPr>
+        <p:txBody>
+          <a:bodyPr wrap="square" rtlCol="0">
+            <a:spAutoFit/>
+          </a:bodyPr>
+          <a:lstStyle/>
+          <a:p>
+            <a:pPr algn="ctr"/>
+            <a:r>
+              <a:rPr lang="en-US" sz="4000" u="sng" dirty="0" smtClean="0">
+                <a:solidFill>
+                  <a:srgbClr val="FFD198"/>
+                </a:solidFill>
+                <a:latin typeface="Raleway Thin"/>
+                <a:cs typeface="Raleway Thin"/>
+              </a:rPr>
+              <a:t>Drupal 8</a:t>
+            </a:r>
+            <a:endParaRPr lang="en-US" sz="4000" u="sng" dirty="0">
+              <a:solidFill>
+                <a:srgbClr val="FFD198"/>
+              </a:solidFill>
+              <a:latin typeface="Raleway Thin"/>
+              <a:cs typeface="Raleway Thin"/>
+            </a:endParaRPr>
+          </a:p>
+        </p:txBody>
+      </p:sp>
+      <p:sp>
+        <p:nvSpPr>
+          <p:cNvPr id="6" name="TextBox 5"/>
+          <p:cNvSpPr txBox="1"/>
+          <p:nvPr/>
+        </p:nvSpPr>
+        <p:spPr>
+          <a:xfrm>
+            <a:off x="5361584" y="623187"/>
+            <a:ext cx="3367100" cy="707886"/>
+          </a:xfrm>
+          <a:prstGeom prst="rect">
+            <a:avLst/>
+          </a:prstGeom>
+          <a:noFill/>
+        </p:spPr>
+        <p:txBody>
+          <a:bodyPr wrap="square" rtlCol="0">
+            <a:spAutoFit/>
+          </a:bodyPr>
+          <a:lstStyle/>
+          <a:p>
+            <a:pPr algn="ctr"/>
+            <a:r>
+              <a:rPr lang="en-US" sz="4000" u="sng" dirty="0" smtClean="0">
+                <a:solidFill>
+                  <a:srgbClr val="FFD198"/>
+                </a:solidFill>
+                <a:latin typeface="Raleway Thin"/>
+                <a:cs typeface="Raleway Thin"/>
+              </a:rPr>
+              <a:t>Drupal 7</a:t>
+            </a:r>
+            <a:endParaRPr lang="en-US" sz="4000" u="sng" dirty="0">
+              <a:solidFill>
+                <a:srgbClr val="FFD198"/>
+              </a:solidFill>
+              <a:latin typeface="Raleway Thin"/>
+              <a:cs typeface="Raleway Thin"/>
+            </a:endParaRPr>
+          </a:p>
+        </p:txBody>
+      </p:sp>
+    </p:spTree>
+    <p:extLst>
+      <p:ext uri="{BB962C8B-B14F-4D97-AF65-F5344CB8AC3E}">
+        <p14:creationId xmlns:p14="http://schemas.microsoft.com/office/powerpoint/2010/main" val="3155982568"/>
+      </p:ext>
+    </p:extLst>
+  </p:cSld>
+  <p:clrMapOvr>
+    <a:masterClrMapping/>
+  </p:clrMapOvr>
+</p:sld>
+</file>
+
+<file path=ppt/slides/slide29.xml><?xml version="1.0" encoding="utf-8"?>
 <p:sld xmlns:a="http://schemas.openxmlformats.org/drawingml/2006/main" xmlns:r="http://schemas.openxmlformats.org/officeDocument/2006/relationships" xmlns:p="http://schemas.openxmlformats.org/presentationml/2006/main">
   <p:cSld>
     <p:spTree>
@@ -19036,7 +19784,240 @@
 </p:sld>
 </file>
 
-<file path=ppt/slides/slide29.xml><?xml version="1.0" encoding="utf-8"?>
+<file path=ppt/slides/slide3.xml><?xml version="1.0" encoding="utf-8"?>
+<p:sld xmlns:a="http://schemas.openxmlformats.org/drawingml/2006/main" xmlns:r="http://schemas.openxmlformats.org/officeDocument/2006/relationships" xmlns:p="http://schemas.openxmlformats.org/presentationml/2006/main">
+  <p:cSld>
+    <p:spTree>
+      <p:nvGrpSpPr>
+        <p:cNvPr id="1" name=""/>
+        <p:cNvGrpSpPr/>
+        <p:nvPr/>
+      </p:nvGrpSpPr>
+      <p:grpSpPr>
+        <a:xfrm>
+          <a:off x="0" y="0"/>
+          <a:ext cx="0" cy="0"/>
+          <a:chOff x="0" y="0"/>
+          <a:chExt cx="0" cy="0"/>
+        </a:xfrm>
+      </p:grpSpPr>
+      <p:pic>
+        <p:nvPicPr>
+          <p:cNvPr id="50" name="Picture 49"/>
+          <p:cNvPicPr>
+            <a:picLocks noChangeAspect="1"/>
+          </p:cNvPicPr>
+          <p:nvPr/>
+        </p:nvPicPr>
+        <p:blipFill>
+          <a:blip r:embed="rId2"/>
+          <a:stretch>
+            <a:fillRect/>
+          </a:stretch>
+        </p:blipFill>
+        <p:spPr>
+          <a:xfrm>
+            <a:off x="3360198" y="850699"/>
+            <a:ext cx="2766002" cy="4747616"/>
+          </a:xfrm>
+          <a:prstGeom prst="rect">
+            <a:avLst/>
+          </a:prstGeom>
+        </p:spPr>
+      </p:pic>
+      <p:sp>
+        <p:nvSpPr>
+          <p:cNvPr id="7" name="TextBox 6"/>
+          <p:cNvSpPr txBox="1"/>
+          <p:nvPr/>
+        </p:nvSpPr>
+        <p:spPr>
+          <a:xfrm>
+            <a:off x="2429562" y="5553102"/>
+            <a:ext cx="3728678" cy="738664"/>
+          </a:xfrm>
+          <a:prstGeom prst="rect">
+            <a:avLst/>
+          </a:prstGeom>
+          <a:noFill/>
+        </p:spPr>
+        <p:txBody>
+          <a:bodyPr wrap="square" rtlCol="0">
+            <a:spAutoFit/>
+          </a:bodyPr>
+          <a:lstStyle/>
+          <a:p>
+            <a:pPr algn="ctr"/>
+            <a:r>
+              <a:rPr lang="en-US" sz="2400" dirty="0">
+                <a:solidFill>
+                  <a:srgbClr val="FB959F"/>
+                </a:solidFill>
+                <a:latin typeface="Anime Ace 2.0 BB"/>
+                <a:cs typeface="Anime Ace 2.0 BB"/>
+              </a:rPr>
+              <a:t>@</a:t>
+            </a:r>
+            <a:r>
+              <a:rPr lang="en-US" sz="2400" dirty="0" err="1" smtClean="0">
+                <a:solidFill>
+                  <a:srgbClr val="FB959F"/>
+                </a:solidFill>
+                <a:latin typeface="Anime Ace 2.0 BB"/>
+                <a:cs typeface="Anime Ace 2.0 BB"/>
+              </a:rPr>
+              <a:t>socketwench</a:t>
+            </a:r>
+            <a:endParaRPr lang="en-US" sz="2400" dirty="0" smtClean="0">
+              <a:solidFill>
+                <a:srgbClr val="FB959F"/>
+              </a:solidFill>
+              <a:latin typeface="Anime Ace 2.0 BB"/>
+              <a:cs typeface="Anime Ace 2.0 BB"/>
+            </a:endParaRPr>
+          </a:p>
+          <a:p>
+            <a:pPr algn="ctr"/>
+            <a:r>
+              <a:rPr lang="en-US" dirty="0" smtClean="0">
+                <a:solidFill>
+                  <a:srgbClr val="FB959F"/>
+                </a:solidFill>
+                <a:latin typeface="Anime Ace 2.0 BB"/>
+                <a:cs typeface="Anime Ace 2.0 BB"/>
+              </a:rPr>
+              <a:t>Tess Flynn</a:t>
+            </a:r>
+            <a:endParaRPr lang="en-US" dirty="0">
+              <a:solidFill>
+                <a:srgbClr val="FB959F"/>
+              </a:solidFill>
+              <a:latin typeface="Anime Ace 2.0 BB"/>
+              <a:cs typeface="Anime Ace 2.0 BB"/>
+            </a:endParaRPr>
+          </a:p>
+        </p:txBody>
+      </p:sp>
+      <p:sp>
+        <p:nvSpPr>
+          <p:cNvPr id="10" name="Oval Callout 9"/>
+          <p:cNvSpPr/>
+          <p:nvPr/>
+        </p:nvSpPr>
+        <p:spPr>
+          <a:xfrm>
+            <a:off x="769040" y="198066"/>
+            <a:ext cx="2749899" cy="1666076"/>
+          </a:xfrm>
+          <a:prstGeom prst="wedgeEllipseCallout">
+            <a:avLst>
+              <a:gd name="adj1" fmla="val 41499"/>
+              <a:gd name="adj2" fmla="val 58304"/>
+            </a:avLst>
+          </a:prstGeom>
+          <a:noFill/>
+          <a:ln>
+            <a:solidFill>
+              <a:srgbClr val="FB959F"/>
+            </a:solidFill>
+          </a:ln>
+        </p:spPr>
+        <p:style>
+          <a:lnRef idx="2">
+            <a:schemeClr val="accent2"/>
+          </a:lnRef>
+          <a:fillRef idx="1">
+            <a:schemeClr val="lt1"/>
+          </a:fillRef>
+          <a:effectRef idx="0">
+            <a:schemeClr val="accent2"/>
+          </a:effectRef>
+          <a:fontRef idx="minor">
+            <a:schemeClr val="dk1"/>
+          </a:fontRef>
+        </p:style>
+        <p:txBody>
+          <a:bodyPr rtlCol="0" anchor="ctr"/>
+          <a:lstStyle/>
+          <a:p>
+            <a:pPr algn="ctr"/>
+            <a:r>
+              <a:rPr lang="en-US" dirty="0" smtClean="0">
+                <a:solidFill>
+                  <a:srgbClr val="FB959F"/>
+                </a:solidFill>
+                <a:latin typeface="Anime Ace 2.0 BB"/>
+                <a:cs typeface="Anime Ace 2.0 BB"/>
+              </a:rPr>
+              <a:t>That’s wench, not wrench.</a:t>
+            </a:r>
+            <a:endParaRPr lang="en-US" dirty="0">
+              <a:solidFill>
+                <a:srgbClr val="FB959F"/>
+              </a:solidFill>
+              <a:latin typeface="Anime Ace 2.0 BB"/>
+              <a:cs typeface="Anime Ace 2.0 BB"/>
+            </a:endParaRPr>
+          </a:p>
+        </p:txBody>
+      </p:sp>
+      <p:sp>
+        <p:nvSpPr>
+          <p:cNvPr id="17" name="Rectangle 16"/>
+          <p:cNvSpPr/>
+          <p:nvPr/>
+        </p:nvSpPr>
+        <p:spPr>
+          <a:xfrm>
+            <a:off x="0" y="0"/>
+            <a:ext cx="9144000" cy="6454588"/>
+          </a:xfrm>
+          <a:prstGeom prst="rect">
+            <a:avLst/>
+          </a:prstGeom>
+          <a:noFill/>
+          <a:ln>
+            <a:noFill/>
+          </a:ln>
+          <a:effectLst/>
+        </p:spPr>
+        <p:style>
+          <a:lnRef idx="2">
+            <a:schemeClr val="dk1"/>
+          </a:lnRef>
+          <a:fillRef idx="1">
+            <a:schemeClr val="lt1"/>
+          </a:fillRef>
+          <a:effectRef idx="0">
+            <a:schemeClr val="dk1"/>
+          </a:effectRef>
+          <a:fontRef idx="minor">
+            <a:schemeClr val="dk1"/>
+          </a:fontRef>
+        </p:style>
+        <p:txBody>
+          <a:bodyPr rtlCol="0" anchor="ctr"/>
+          <a:lstStyle/>
+          <a:p>
+            <a:pPr algn="ctr"/>
+            <a:endParaRPr lang="en-US"/>
+          </a:p>
+        </p:txBody>
+      </p:sp>
+    </p:spTree>
+    <p:extLst>
+      <p:ext uri="{BB962C8B-B14F-4D97-AF65-F5344CB8AC3E}">
+        <p14:creationId xmlns:p14="http://schemas.microsoft.com/office/powerpoint/2010/main" val="1337342055"/>
+      </p:ext>
+    </p:extLst>
+  </p:cSld>
+  <p:clrMapOvr>
+    <a:masterClrMapping/>
+  </p:clrMapOvr>
+</p:sld>
+</file>
+
+<file path=ppt/slides/slide30.xml><?xml version="1.0" encoding="utf-8"?>
 <p:sld xmlns:a="http://schemas.openxmlformats.org/drawingml/2006/main" xmlns:r="http://schemas.openxmlformats.org/officeDocument/2006/relationships" xmlns:p="http://schemas.openxmlformats.org/presentationml/2006/main">
   <p:cSld>
     <p:spTree>
@@ -19851,240 +20832,7 @@
 </p:sld>
 </file>
 
-<file path=ppt/slides/slide3.xml><?xml version="1.0" encoding="utf-8"?>
-<p:sld xmlns:a="http://schemas.openxmlformats.org/drawingml/2006/main" xmlns:r="http://schemas.openxmlformats.org/officeDocument/2006/relationships" xmlns:p="http://schemas.openxmlformats.org/presentationml/2006/main">
-  <p:cSld>
-    <p:spTree>
-      <p:nvGrpSpPr>
-        <p:cNvPr id="1" name=""/>
-        <p:cNvGrpSpPr/>
-        <p:nvPr/>
-      </p:nvGrpSpPr>
-      <p:grpSpPr>
-        <a:xfrm>
-          <a:off x="0" y="0"/>
-          <a:ext cx="0" cy="0"/>
-          <a:chOff x="0" y="0"/>
-          <a:chExt cx="0" cy="0"/>
-        </a:xfrm>
-      </p:grpSpPr>
-      <p:pic>
-        <p:nvPicPr>
-          <p:cNvPr id="50" name="Picture 49"/>
-          <p:cNvPicPr>
-            <a:picLocks noChangeAspect="1"/>
-          </p:cNvPicPr>
-          <p:nvPr/>
-        </p:nvPicPr>
-        <p:blipFill>
-          <a:blip r:embed="rId2"/>
-          <a:stretch>
-            <a:fillRect/>
-          </a:stretch>
-        </p:blipFill>
-        <p:spPr>
-          <a:xfrm>
-            <a:off x="3360198" y="850699"/>
-            <a:ext cx="2766002" cy="4747616"/>
-          </a:xfrm>
-          <a:prstGeom prst="rect">
-            <a:avLst/>
-          </a:prstGeom>
-        </p:spPr>
-      </p:pic>
-      <p:sp>
-        <p:nvSpPr>
-          <p:cNvPr id="7" name="TextBox 6"/>
-          <p:cNvSpPr txBox="1"/>
-          <p:nvPr/>
-        </p:nvSpPr>
-        <p:spPr>
-          <a:xfrm>
-            <a:off x="2429562" y="5553102"/>
-            <a:ext cx="3728678" cy="738664"/>
-          </a:xfrm>
-          <a:prstGeom prst="rect">
-            <a:avLst/>
-          </a:prstGeom>
-          <a:noFill/>
-        </p:spPr>
-        <p:txBody>
-          <a:bodyPr wrap="square" rtlCol="0">
-            <a:spAutoFit/>
-          </a:bodyPr>
-          <a:lstStyle/>
-          <a:p>
-            <a:pPr algn="ctr"/>
-            <a:r>
-              <a:rPr lang="en-US" sz="2400" dirty="0">
-                <a:solidFill>
-                  <a:srgbClr val="FB959F"/>
-                </a:solidFill>
-                <a:latin typeface="Anime Ace 2.0 BB"/>
-                <a:cs typeface="Anime Ace 2.0 BB"/>
-              </a:rPr>
-              <a:t>@</a:t>
-            </a:r>
-            <a:r>
-              <a:rPr lang="en-US" sz="2400" dirty="0" err="1" smtClean="0">
-                <a:solidFill>
-                  <a:srgbClr val="FB959F"/>
-                </a:solidFill>
-                <a:latin typeface="Anime Ace 2.0 BB"/>
-                <a:cs typeface="Anime Ace 2.0 BB"/>
-              </a:rPr>
-              <a:t>socketwench</a:t>
-            </a:r>
-            <a:endParaRPr lang="en-US" sz="2400" dirty="0" smtClean="0">
-              <a:solidFill>
-                <a:srgbClr val="FB959F"/>
-              </a:solidFill>
-              <a:latin typeface="Anime Ace 2.0 BB"/>
-              <a:cs typeface="Anime Ace 2.0 BB"/>
-            </a:endParaRPr>
-          </a:p>
-          <a:p>
-            <a:pPr algn="ctr"/>
-            <a:r>
-              <a:rPr lang="en-US" dirty="0" smtClean="0">
-                <a:solidFill>
-                  <a:srgbClr val="FB959F"/>
-                </a:solidFill>
-                <a:latin typeface="Anime Ace 2.0 BB"/>
-                <a:cs typeface="Anime Ace 2.0 BB"/>
-              </a:rPr>
-              <a:t>Tess Flynn</a:t>
-            </a:r>
-            <a:endParaRPr lang="en-US" dirty="0">
-              <a:solidFill>
-                <a:srgbClr val="FB959F"/>
-              </a:solidFill>
-              <a:latin typeface="Anime Ace 2.0 BB"/>
-              <a:cs typeface="Anime Ace 2.0 BB"/>
-            </a:endParaRPr>
-          </a:p>
-        </p:txBody>
-      </p:sp>
-      <p:sp>
-        <p:nvSpPr>
-          <p:cNvPr id="10" name="Oval Callout 9"/>
-          <p:cNvSpPr/>
-          <p:nvPr/>
-        </p:nvSpPr>
-        <p:spPr>
-          <a:xfrm>
-            <a:off x="769040" y="198066"/>
-            <a:ext cx="2749899" cy="1666076"/>
-          </a:xfrm>
-          <a:prstGeom prst="wedgeEllipseCallout">
-            <a:avLst>
-              <a:gd name="adj1" fmla="val 41499"/>
-              <a:gd name="adj2" fmla="val 58304"/>
-            </a:avLst>
-          </a:prstGeom>
-          <a:noFill/>
-          <a:ln>
-            <a:solidFill>
-              <a:srgbClr val="FB959F"/>
-            </a:solidFill>
-          </a:ln>
-        </p:spPr>
-        <p:style>
-          <a:lnRef idx="2">
-            <a:schemeClr val="accent2"/>
-          </a:lnRef>
-          <a:fillRef idx="1">
-            <a:schemeClr val="lt1"/>
-          </a:fillRef>
-          <a:effectRef idx="0">
-            <a:schemeClr val="accent2"/>
-          </a:effectRef>
-          <a:fontRef idx="minor">
-            <a:schemeClr val="dk1"/>
-          </a:fontRef>
-        </p:style>
-        <p:txBody>
-          <a:bodyPr rtlCol="0" anchor="ctr"/>
-          <a:lstStyle/>
-          <a:p>
-            <a:pPr algn="ctr"/>
-            <a:r>
-              <a:rPr lang="en-US" dirty="0" smtClean="0">
-                <a:solidFill>
-                  <a:srgbClr val="FB959F"/>
-                </a:solidFill>
-                <a:latin typeface="Anime Ace 2.0 BB"/>
-                <a:cs typeface="Anime Ace 2.0 BB"/>
-              </a:rPr>
-              <a:t>That’s wench, not wrench.</a:t>
-            </a:r>
-            <a:endParaRPr lang="en-US" dirty="0">
-              <a:solidFill>
-                <a:srgbClr val="FB959F"/>
-              </a:solidFill>
-              <a:latin typeface="Anime Ace 2.0 BB"/>
-              <a:cs typeface="Anime Ace 2.0 BB"/>
-            </a:endParaRPr>
-          </a:p>
-        </p:txBody>
-      </p:sp>
-      <p:sp>
-        <p:nvSpPr>
-          <p:cNvPr id="17" name="Rectangle 16"/>
-          <p:cNvSpPr/>
-          <p:nvPr/>
-        </p:nvSpPr>
-        <p:spPr>
-          <a:xfrm>
-            <a:off x="0" y="0"/>
-            <a:ext cx="9144000" cy="6454588"/>
-          </a:xfrm>
-          <a:prstGeom prst="rect">
-            <a:avLst/>
-          </a:prstGeom>
-          <a:noFill/>
-          <a:ln>
-            <a:noFill/>
-          </a:ln>
-          <a:effectLst/>
-        </p:spPr>
-        <p:style>
-          <a:lnRef idx="2">
-            <a:schemeClr val="dk1"/>
-          </a:lnRef>
-          <a:fillRef idx="1">
-            <a:schemeClr val="lt1"/>
-          </a:fillRef>
-          <a:effectRef idx="0">
-            <a:schemeClr val="dk1"/>
-          </a:effectRef>
-          <a:fontRef idx="minor">
-            <a:schemeClr val="dk1"/>
-          </a:fontRef>
-        </p:style>
-        <p:txBody>
-          <a:bodyPr rtlCol="0" anchor="ctr"/>
-          <a:lstStyle/>
-          <a:p>
-            <a:pPr algn="ctr"/>
-            <a:endParaRPr lang="en-US"/>
-          </a:p>
-        </p:txBody>
-      </p:sp>
-    </p:spTree>
-    <p:extLst>
-      <p:ext uri="{BB962C8B-B14F-4D97-AF65-F5344CB8AC3E}">
-        <p14:creationId xmlns:p14="http://schemas.microsoft.com/office/powerpoint/2010/main" val="1337342055"/>
-      </p:ext>
-    </p:extLst>
-  </p:cSld>
-  <p:clrMapOvr>
-    <a:masterClrMapping/>
-  </p:clrMapOvr>
-</p:sld>
-</file>
-
-<file path=ppt/slides/slide30.xml><?xml version="1.0" encoding="utf-8"?>
+<file path=ppt/slides/slide31.xml><?xml version="1.0" encoding="utf-8"?>
 <p:sld xmlns:a="http://schemas.openxmlformats.org/drawingml/2006/main" xmlns:r="http://schemas.openxmlformats.org/officeDocument/2006/relationships" xmlns:p="http://schemas.openxmlformats.org/presentationml/2006/main">
   <p:cSld>
     <p:spTree>

</xml_diff>